<commit_message>
feat: #2. setup initial header
</commit_message>
<xml_diff>
--- a/docs/icon-design.pptx
+++ b/docs/icon-design.pptx
@@ -6,6 +6,7 @@
   </p:sldMasterIdLst>
   <p:sldIdLst>
     <p:sldId id="256" r:id="rId2"/>
+    <p:sldId id="257" r:id="rId3"/>
   </p:sldIdLst>
   <p:sldSz cx="12192000" cy="6858000"/>
   <p:notesSz cx="6858000" cy="9144000"/>
@@ -104,6 +105,11 @@
       </a:defRPr>
     </a:lvl9pPr>
   </p:defaultTextStyle>
+  <p:extLst>
+    <p:ext uri="{EFAFB233-063F-42B5-8137-9DF3F51BA10A}">
+      <p15:sldGuideLst xmlns:p15="http://schemas.microsoft.com/office/powerpoint/2012/main"/>
+    </p:ext>
+  </p:extLst>
 </p:presentation>
 </file>
 
@@ -3307,6 +3313,14 @@
 <file path=ppt/slides/slide1.xml><?xml version="1.0" encoding="utf-8"?>
 <p:sld xmlns:a="http://schemas.openxmlformats.org/drawingml/2006/main" xmlns:r="http://schemas.openxmlformats.org/officeDocument/2006/relationships" xmlns:p="http://schemas.openxmlformats.org/presentationml/2006/main">
   <p:cSld>
+    <p:bg>
+      <p:bgPr>
+        <a:solidFill>
+          <a:schemeClr val="accent1"/>
+        </a:solidFill>
+        <a:effectLst/>
+      </p:bgPr>
+    </p:bg>
     <p:spTree>
       <p:nvGrpSpPr>
         <p:cNvPr id="1" name=""/>
@@ -3409,25 +3423,9 @@
             <a:r>
               <a:rPr lang="en-US" sz="5400" b="0" i="1" cap="none" spc="0" dirty="0">
                 <a:ln w="0"/>
-                <a:gradFill>
-                  <a:gsLst>
-                    <a:gs pos="0">
-                      <a:schemeClr val="accent5">
-                        <a:lumMod val="50000"/>
-                      </a:schemeClr>
-                    </a:gs>
-                    <a:gs pos="50000">
-                      <a:schemeClr val="accent5"/>
-                    </a:gs>
-                    <a:gs pos="100000">
-                      <a:schemeClr val="accent5">
-                        <a:lumMod val="60000"/>
-                        <a:lumOff val="40000"/>
-                      </a:schemeClr>
-                    </a:gs>
-                  </a:gsLst>
-                  <a:lin ang="5400000"/>
-                </a:gradFill>
+                <a:solidFill>
+                  <a:schemeClr val="bg1"/>
+                </a:solidFill>
                 <a:effectLst>
                   <a:reflection blurRad="6350" stA="53000" endA="300" endPos="35500" dir="5400000" sy="-90000" algn="bl" rotWithShape="0"/>
                 </a:effectLst>
@@ -3469,25 +3467,9 @@
             <a:r>
               <a:rPr lang="en-US" sz="4400" dirty="0">
                 <a:ln w="0"/>
-                <a:gradFill>
-                  <a:gsLst>
-                    <a:gs pos="0">
-                      <a:schemeClr val="accent5">
-                        <a:lumMod val="50000"/>
-                      </a:schemeClr>
-                    </a:gs>
-                    <a:gs pos="50000">
-                      <a:schemeClr val="accent5"/>
-                    </a:gs>
-                    <a:gs pos="100000">
-                      <a:schemeClr val="accent5">
-                        <a:lumMod val="60000"/>
-                        <a:lumOff val="40000"/>
-                      </a:schemeClr>
-                    </a:gs>
-                  </a:gsLst>
-                  <a:lin ang="5400000"/>
-                </a:gradFill>
+                <a:solidFill>
+                  <a:schemeClr val="bg1"/>
+                </a:solidFill>
                 <a:effectLst>
                   <a:reflection blurRad="6350" stA="53000" endA="300" endPos="35500" dir="5400000" sy="-90000" algn="bl" rotWithShape="0"/>
                 </a:effectLst>
@@ -3501,6 +3483,184 @@
     <p:extLst>
       <p:ext uri="{BB962C8B-B14F-4D97-AF65-F5344CB8AC3E}">
         <p14:creationId xmlns:p14="http://schemas.microsoft.com/office/powerpoint/2010/main" val="2844639942"/>
+      </p:ext>
+    </p:extLst>
+  </p:cSld>
+  <p:clrMapOvr>
+    <a:masterClrMapping/>
+  </p:clrMapOvr>
+</p:sld>
+</file>
+
+<file path=ppt/slides/slide2.xml><?xml version="1.0" encoding="utf-8"?>
+<p:sld xmlns:a="http://schemas.openxmlformats.org/drawingml/2006/main" xmlns:r="http://schemas.openxmlformats.org/officeDocument/2006/relationships" xmlns:p="http://schemas.openxmlformats.org/presentationml/2006/main">
+  <p:cSld>
+    <p:spTree>
+      <p:nvGrpSpPr>
+        <p:cNvPr id="1" name=""/>
+        <p:cNvGrpSpPr/>
+        <p:nvPr/>
+      </p:nvGrpSpPr>
+      <p:grpSpPr>
+        <a:xfrm>
+          <a:off x="0" y="0"/>
+          <a:ext cx="0" cy="0"/>
+          <a:chOff x="0" y="0"/>
+          <a:chExt cx="0" cy="0"/>
+        </a:xfrm>
+      </p:grpSpPr>
+      <p:sp>
+        <p:nvSpPr>
+          <p:cNvPr id="8" name="Rectangle 7">
+            <a:extLst>
+              <a:ext uri="{FF2B5EF4-FFF2-40B4-BE49-F238E27FC236}">
+                <a16:creationId xmlns:a16="http://schemas.microsoft.com/office/drawing/2014/main" id="{39D4A3D9-9097-495E-91BD-3AA851A79689}"/>
+              </a:ext>
+            </a:extLst>
+          </p:cNvPr>
+          <p:cNvSpPr/>
+          <p:nvPr/>
+        </p:nvSpPr>
+        <p:spPr>
+          <a:xfrm>
+            <a:off x="6691403" y="3009334"/>
+            <a:ext cx="745717" cy="769441"/>
+          </a:xfrm>
+          <a:prstGeom prst="rect">
+            <a:avLst/>
+          </a:prstGeom>
+          <a:noFill/>
+        </p:spPr>
+        <p:txBody>
+          <a:bodyPr wrap="none" lIns="91440" tIns="45720" rIns="91440" bIns="45720">
+            <a:spAutoFit/>
+          </a:bodyPr>
+          <a:lstStyle/>
+          <a:p>
+            <a:pPr algn="ctr"/>
+            <a:r>
+              <a:rPr lang="en-AU" sz="4400" dirty="0">
+                <a:ln w="0"/>
+                <a:solidFill>
+                  <a:srgbClr val="FFC000"/>
+                </a:solidFill>
+                <a:effectLst>
+                  <a:reflection blurRad="6350" stA="53000" endA="300" endPos="35500" dir="5400000" sy="-90000" algn="bl" rotWithShape="0"/>
+                </a:effectLst>
+              </a:rPr>
+              <a:t>&lt;</a:t>
+            </a:r>
+            <a:r>
+              <a:rPr lang="en-US" sz="4400" dirty="0">
+                <a:ln w="0"/>
+                <a:solidFill>
+                  <a:srgbClr val="FFC000"/>
+                </a:solidFill>
+                <a:effectLst>
+                  <a:reflection blurRad="6350" stA="53000" endA="300" endPos="35500" dir="5400000" sy="-90000" algn="bl" rotWithShape="0"/>
+                </a:effectLst>
+              </a:rPr>
+              <a:t>&lt;</a:t>
+            </a:r>
+          </a:p>
+        </p:txBody>
+      </p:sp>
+      <p:sp>
+        <p:nvSpPr>
+          <p:cNvPr id="4" name="Rectangle 3">
+            <a:extLst>
+              <a:ext uri="{FF2B5EF4-FFF2-40B4-BE49-F238E27FC236}">
+                <a16:creationId xmlns:a16="http://schemas.microsoft.com/office/drawing/2014/main" id="{E0911C46-6A15-40D8-8FBD-1CCCF89C5472}"/>
+              </a:ext>
+            </a:extLst>
+          </p:cNvPr>
+          <p:cNvSpPr/>
+          <p:nvPr/>
+        </p:nvSpPr>
+        <p:spPr>
+          <a:xfrm>
+            <a:off x="4770120" y="2932390"/>
+            <a:ext cx="2103120" cy="923330"/>
+          </a:xfrm>
+          <a:prstGeom prst="rect">
+            <a:avLst/>
+          </a:prstGeom>
+          <a:noFill/>
+        </p:spPr>
+        <p:txBody>
+          <a:bodyPr wrap="square" lIns="91440" tIns="45720" rIns="91440" bIns="45720">
+            <a:spAutoFit/>
+          </a:bodyPr>
+          <a:lstStyle/>
+          <a:p>
+            <a:pPr algn="r"/>
+            <a:r>
+              <a:rPr lang="en-US" sz="5400" b="0" i="1" cap="none" spc="0" dirty="0">
+                <a:ln w="0"/>
+                <a:solidFill>
+                  <a:schemeClr val="accent1">
+                    <a:lumMod val="75000"/>
+                  </a:schemeClr>
+                </a:solidFill>
+                <a:effectLst>
+                  <a:reflection blurRad="6350" stA="53000" endA="300" endPos="35500" dir="5400000" sy="-90000" algn="bl" rotWithShape="0"/>
+                </a:effectLst>
+              </a:rPr>
+              <a:t>Starter</a:t>
+            </a:r>
+          </a:p>
+        </p:txBody>
+      </p:sp>
+      <p:sp>
+        <p:nvSpPr>
+          <p:cNvPr id="10" name="Rectangle 9">
+            <a:extLst>
+              <a:ext uri="{FF2B5EF4-FFF2-40B4-BE49-F238E27FC236}">
+                <a16:creationId xmlns:a16="http://schemas.microsoft.com/office/drawing/2014/main" id="{508E5743-1AC0-4BF9-B9D6-9E80C875A30B}"/>
+              </a:ext>
+            </a:extLst>
+          </p:cNvPr>
+          <p:cNvSpPr/>
+          <p:nvPr/>
+        </p:nvSpPr>
+        <p:spPr>
+          <a:xfrm>
+            <a:off x="6730701" y="3116014"/>
+            <a:ext cx="835959" cy="769441"/>
+          </a:xfrm>
+          <a:prstGeom prst="rect">
+            <a:avLst/>
+          </a:prstGeom>
+          <a:noFill/>
+        </p:spPr>
+        <p:txBody>
+          <a:bodyPr wrap="square" lIns="91440" tIns="45720" rIns="91440" bIns="45720">
+            <a:spAutoFit/>
+          </a:bodyPr>
+          <a:lstStyle/>
+          <a:p>
+            <a:pPr algn="r"/>
+            <a:r>
+              <a:rPr lang="en-US" sz="4400" dirty="0">
+                <a:ln w="0"/>
+                <a:solidFill>
+                  <a:schemeClr val="accent1">
+                    <a:lumMod val="75000"/>
+                  </a:schemeClr>
+                </a:solidFill>
+                <a:effectLst>
+                  <a:reflection blurRad="6350" stA="53000" endA="300" endPos="35500" dir="5400000" sy="-90000" algn="bl" rotWithShape="0"/>
+                </a:effectLst>
+              </a:rPr>
+              <a:t>&gt;&gt;</a:t>
+            </a:r>
+          </a:p>
+        </p:txBody>
+      </p:sp>
+    </p:spTree>
+    <p:extLst>
+      <p:ext uri="{BB962C8B-B14F-4D97-AF65-F5344CB8AC3E}">
+        <p14:creationId xmlns:p14="http://schemas.microsoft.com/office/powerpoint/2010/main" val="2906108470"/>
       </p:ext>
     </p:extLst>
   </p:cSld>

</xml_diff>

<commit_message>
feat: #2. Sidebar Tree Menu: UX improvements:
1. Expand arrow: use right arrow (instead of down arrow);
2. add animation to the expand/collapse arrow
</commit_message>
<xml_diff>
--- a/docs/icon-design.pptx
+++ b/docs/icon-design.pptx
@@ -260,7 +260,7 @@
           <a:p>
             <a:fld id="{22BA11A9-CA4B-450C-8844-99692A061B26}" type="datetimeFigureOut">
               <a:rPr lang="en-US" smtClean="0"/>
-              <a:t>8/17/2020</a:t>
+              <a:t>8/31/2020</a:t>
             </a:fld>
             <a:endParaRPr lang="en-US"/>
           </a:p>
@@ -458,7 +458,7 @@
           <a:p>
             <a:fld id="{22BA11A9-CA4B-450C-8844-99692A061B26}" type="datetimeFigureOut">
               <a:rPr lang="en-US" smtClean="0"/>
-              <a:t>8/17/2020</a:t>
+              <a:t>8/31/2020</a:t>
             </a:fld>
             <a:endParaRPr lang="en-US"/>
           </a:p>
@@ -666,7 +666,7 @@
           <a:p>
             <a:fld id="{22BA11A9-CA4B-450C-8844-99692A061B26}" type="datetimeFigureOut">
               <a:rPr lang="en-US" smtClean="0"/>
-              <a:t>8/17/2020</a:t>
+              <a:t>8/31/2020</a:t>
             </a:fld>
             <a:endParaRPr lang="en-US"/>
           </a:p>
@@ -864,7 +864,7 @@
           <a:p>
             <a:fld id="{22BA11A9-CA4B-450C-8844-99692A061B26}" type="datetimeFigureOut">
               <a:rPr lang="en-US" smtClean="0"/>
-              <a:t>8/17/2020</a:t>
+              <a:t>8/31/2020</a:t>
             </a:fld>
             <a:endParaRPr lang="en-US"/>
           </a:p>
@@ -1139,7 +1139,7 @@
           <a:p>
             <a:fld id="{22BA11A9-CA4B-450C-8844-99692A061B26}" type="datetimeFigureOut">
               <a:rPr lang="en-US" smtClean="0"/>
-              <a:t>8/17/2020</a:t>
+              <a:t>8/31/2020</a:t>
             </a:fld>
             <a:endParaRPr lang="en-US"/>
           </a:p>
@@ -1404,7 +1404,7 @@
           <a:p>
             <a:fld id="{22BA11A9-CA4B-450C-8844-99692A061B26}" type="datetimeFigureOut">
               <a:rPr lang="en-US" smtClean="0"/>
-              <a:t>8/17/2020</a:t>
+              <a:t>8/31/2020</a:t>
             </a:fld>
             <a:endParaRPr lang="en-US"/>
           </a:p>
@@ -1816,7 +1816,7 @@
           <a:p>
             <a:fld id="{22BA11A9-CA4B-450C-8844-99692A061B26}" type="datetimeFigureOut">
               <a:rPr lang="en-US" smtClean="0"/>
-              <a:t>8/17/2020</a:t>
+              <a:t>8/31/2020</a:t>
             </a:fld>
             <a:endParaRPr lang="en-US"/>
           </a:p>
@@ -1957,7 +1957,7 @@
           <a:p>
             <a:fld id="{22BA11A9-CA4B-450C-8844-99692A061B26}" type="datetimeFigureOut">
               <a:rPr lang="en-US" smtClean="0"/>
-              <a:t>8/17/2020</a:t>
+              <a:t>8/31/2020</a:t>
             </a:fld>
             <a:endParaRPr lang="en-US"/>
           </a:p>
@@ -2070,7 +2070,7 @@
           <a:p>
             <a:fld id="{22BA11A9-CA4B-450C-8844-99692A061B26}" type="datetimeFigureOut">
               <a:rPr lang="en-US" smtClean="0"/>
-              <a:t>8/17/2020</a:t>
+              <a:t>8/31/2020</a:t>
             </a:fld>
             <a:endParaRPr lang="en-US"/>
           </a:p>
@@ -2381,7 +2381,7 @@
           <a:p>
             <a:fld id="{22BA11A9-CA4B-450C-8844-99692A061B26}" type="datetimeFigureOut">
               <a:rPr lang="en-US" smtClean="0"/>
-              <a:t>8/17/2020</a:t>
+              <a:t>8/31/2020</a:t>
             </a:fld>
             <a:endParaRPr lang="en-US"/>
           </a:p>
@@ -2669,7 +2669,7 @@
           <a:p>
             <a:fld id="{22BA11A9-CA4B-450C-8844-99692A061B26}" type="datetimeFigureOut">
               <a:rPr lang="en-US" smtClean="0"/>
-              <a:t>8/17/2020</a:t>
+              <a:t>8/31/2020</a:t>
             </a:fld>
             <a:endParaRPr lang="en-US"/>
           </a:p>
@@ -2910,7 +2910,7 @@
           <a:p>
             <a:fld id="{22BA11A9-CA4B-450C-8844-99692A061B26}" type="datetimeFigureOut">
               <a:rPr lang="en-US" smtClean="0"/>
-              <a:t>8/17/2020</a:t>
+              <a:t>8/31/2020</a:t>
             </a:fld>
             <a:endParaRPr lang="en-US"/>
           </a:p>
@@ -3316,7 +3316,7 @@
     <p:bg>
       <p:bgPr>
         <a:solidFill>
-          <a:schemeClr val="accent1"/>
+          <a:schemeClr val="tx1"/>
         </a:solidFill>
         <a:effectLst/>
       </p:bgPr>
@@ -3337,6 +3337,46 @@
       </p:grpSpPr>
       <p:sp>
         <p:nvSpPr>
+          <p:cNvPr id="7" name="TextBox 6">
+            <a:extLst>
+              <a:ext uri="{FF2B5EF4-FFF2-40B4-BE49-F238E27FC236}">
+                <a16:creationId xmlns:a16="http://schemas.microsoft.com/office/drawing/2014/main" id="{AEF7940D-1949-4BEC-BF1A-821E98AC38CA}"/>
+              </a:ext>
+            </a:extLst>
+          </p:cNvPr>
+          <p:cNvSpPr txBox="1"/>
+          <p:nvPr/>
+        </p:nvSpPr>
+        <p:spPr>
+          <a:xfrm>
+            <a:off x="2006600" y="1935233"/>
+            <a:ext cx="2784737" cy="923330"/>
+          </a:xfrm>
+          <a:prstGeom prst="rect">
+            <a:avLst/>
+          </a:prstGeom>
+          <a:noFill/>
+        </p:spPr>
+        <p:txBody>
+          <a:bodyPr wrap="none" rtlCol="0">
+            <a:spAutoFit/>
+          </a:bodyPr>
+          <a:lstStyle/>
+          <a:p>
+            <a:r>
+              <a:rPr lang="en-US" sz="5400" dirty="0">
+                <a:solidFill>
+                  <a:schemeClr val="bg1"/>
+                </a:solidFill>
+                <a:latin typeface="Ink Free" panose="03080402000500000000" pitchFamily="66" charset="0"/>
+              </a:rPr>
+              <a:t>D    PLA!</a:t>
+            </a:r>
+          </a:p>
+        </p:txBody>
+      </p:sp>
+      <p:sp>
+        <p:nvSpPr>
           <p:cNvPr id="8" name="Rectangle 7">
             <a:extLst>
               <a:ext uri="{FF2B5EF4-FFF2-40B4-BE49-F238E27FC236}">
@@ -3349,7 +3389,7 @@
         </p:nvSpPr>
         <p:spPr>
           <a:xfrm>
-            <a:off x="6691403" y="3009334"/>
+            <a:off x="10252288" y="2965372"/>
             <a:ext cx="745717" cy="769441"/>
           </a:xfrm>
           <a:prstGeom prst="rect">
@@ -3405,7 +3445,7 @@
         </p:nvSpPr>
         <p:spPr>
           <a:xfrm>
-            <a:off x="4770120" y="2932390"/>
+            <a:off x="8331005" y="2888428"/>
             <a:ext cx="2103120" cy="923330"/>
           </a:xfrm>
           <a:prstGeom prst="rect">
@@ -3449,7 +3489,7 @@
         </p:nvSpPr>
         <p:spPr>
           <a:xfrm>
-            <a:off x="6730701" y="3116014"/>
+            <a:off x="10291586" y="3072052"/>
             <a:ext cx="835959" cy="769441"/>
           </a:xfrm>
           <a:prstGeom prst="rect">
@@ -3479,6 +3519,794 @@
           </a:p>
         </p:txBody>
       </p:sp>
+      <p:grpSp>
+        <p:nvGrpSpPr>
+          <p:cNvPr id="23" name="Group 22">
+            <a:extLst>
+              <a:ext uri="{FF2B5EF4-FFF2-40B4-BE49-F238E27FC236}">
+                <a16:creationId xmlns:a16="http://schemas.microsoft.com/office/drawing/2014/main" id="{CA281F9A-8BCD-48D2-B147-A7E5BA9F3581}"/>
+              </a:ext>
+            </a:extLst>
+          </p:cNvPr>
+          <p:cNvGrpSpPr/>
+          <p:nvPr/>
+        </p:nvGrpSpPr>
+        <p:grpSpPr>
+          <a:xfrm>
+            <a:off x="6461760" y="1402080"/>
+            <a:ext cx="716280" cy="685800"/>
+            <a:chOff x="6461760" y="1402080"/>
+            <a:chExt cx="716280" cy="685800"/>
+          </a:xfrm>
+        </p:grpSpPr>
+        <p:sp>
+          <p:nvSpPr>
+            <p:cNvPr id="12" name="Oval 11">
+              <a:extLst>
+                <a:ext uri="{FF2B5EF4-FFF2-40B4-BE49-F238E27FC236}">
+                  <a16:creationId xmlns:a16="http://schemas.microsoft.com/office/drawing/2014/main" id="{9257DF33-4BB5-43C0-B693-85BB7B4FF4C3}"/>
+                </a:ext>
+              </a:extLst>
+            </p:cNvPr>
+            <p:cNvSpPr/>
+            <p:nvPr/>
+          </p:nvSpPr>
+          <p:spPr>
+            <a:xfrm>
+              <a:off x="6461760" y="1402080"/>
+              <a:ext cx="477520" cy="457200"/>
+            </a:xfrm>
+            <a:prstGeom prst="ellipse">
+              <a:avLst/>
+            </a:prstGeom>
+          </p:spPr>
+          <p:style>
+            <a:lnRef idx="2">
+              <a:schemeClr val="accent1">
+                <a:shade val="50000"/>
+              </a:schemeClr>
+            </a:lnRef>
+            <a:fillRef idx="1">
+              <a:schemeClr val="accent1"/>
+            </a:fillRef>
+            <a:effectRef idx="0">
+              <a:schemeClr val="accent1"/>
+            </a:effectRef>
+            <a:fontRef idx="minor">
+              <a:schemeClr val="lt1"/>
+            </a:fontRef>
+          </p:style>
+          <p:txBody>
+            <a:bodyPr rtlCol="0" anchor="ctr"/>
+            <a:lstStyle/>
+            <a:p>
+              <a:pPr algn="ctr"/>
+              <a:endParaRPr lang="en-US"/>
+            </a:p>
+          </p:txBody>
+        </p:sp>
+        <p:sp>
+          <p:nvSpPr>
+            <p:cNvPr id="14" name="Oval 13">
+              <a:extLst>
+                <a:ext uri="{FF2B5EF4-FFF2-40B4-BE49-F238E27FC236}">
+                  <a16:creationId xmlns:a16="http://schemas.microsoft.com/office/drawing/2014/main" id="{948F2F45-5253-4D82-94F6-570C4315DBED}"/>
+                </a:ext>
+              </a:extLst>
+            </p:cNvPr>
+            <p:cNvSpPr/>
+            <p:nvPr/>
+          </p:nvSpPr>
+          <p:spPr>
+            <a:xfrm>
+              <a:off x="6700520" y="1402080"/>
+              <a:ext cx="477520" cy="457200"/>
+            </a:xfrm>
+            <a:prstGeom prst="ellipse">
+              <a:avLst/>
+            </a:prstGeom>
+            <a:ln>
+              <a:noFill/>
+            </a:ln>
+          </p:spPr>
+          <p:style>
+            <a:lnRef idx="3">
+              <a:schemeClr val="lt1"/>
+            </a:lnRef>
+            <a:fillRef idx="1">
+              <a:schemeClr val="accent2"/>
+            </a:fillRef>
+            <a:effectRef idx="1">
+              <a:schemeClr val="accent2"/>
+            </a:effectRef>
+            <a:fontRef idx="minor">
+              <a:schemeClr val="lt1"/>
+            </a:fontRef>
+          </p:style>
+          <p:txBody>
+            <a:bodyPr rtlCol="0" anchor="ctr"/>
+            <a:lstStyle/>
+            <a:p>
+              <a:pPr algn="ctr"/>
+              <a:endParaRPr lang="en-US"/>
+            </a:p>
+          </p:txBody>
+        </p:sp>
+        <p:sp>
+          <p:nvSpPr>
+            <p:cNvPr id="20" name="Oval 19">
+              <a:extLst>
+                <a:ext uri="{FF2B5EF4-FFF2-40B4-BE49-F238E27FC236}">
+                  <a16:creationId xmlns:a16="http://schemas.microsoft.com/office/drawing/2014/main" id="{C3A75B4E-ED81-40CA-BCA1-68043EC131B9}"/>
+                </a:ext>
+              </a:extLst>
+            </p:cNvPr>
+            <p:cNvSpPr/>
+            <p:nvPr/>
+          </p:nvSpPr>
+          <p:spPr>
+            <a:xfrm>
+              <a:off x="6700520" y="1630680"/>
+              <a:ext cx="477520" cy="457200"/>
+            </a:xfrm>
+            <a:prstGeom prst="ellipse">
+              <a:avLst/>
+            </a:prstGeom>
+          </p:spPr>
+          <p:style>
+            <a:lnRef idx="2">
+              <a:schemeClr val="accent6">
+                <a:shade val="50000"/>
+              </a:schemeClr>
+            </a:lnRef>
+            <a:fillRef idx="1">
+              <a:schemeClr val="accent6"/>
+            </a:fillRef>
+            <a:effectRef idx="0">
+              <a:schemeClr val="accent6"/>
+            </a:effectRef>
+            <a:fontRef idx="minor">
+              <a:schemeClr val="lt1"/>
+            </a:fontRef>
+          </p:style>
+          <p:txBody>
+            <a:bodyPr rtlCol="0" anchor="ctr"/>
+            <a:lstStyle/>
+            <a:p>
+              <a:pPr algn="ctr"/>
+              <a:endParaRPr lang="en-US"/>
+            </a:p>
+          </p:txBody>
+        </p:sp>
+        <p:sp>
+          <p:nvSpPr>
+            <p:cNvPr id="22" name="Oval 21">
+              <a:extLst>
+                <a:ext uri="{FF2B5EF4-FFF2-40B4-BE49-F238E27FC236}">
+                  <a16:creationId xmlns:a16="http://schemas.microsoft.com/office/drawing/2014/main" id="{9D2C104B-D77D-482D-AE4C-A3A93ACEF036}"/>
+                </a:ext>
+              </a:extLst>
+            </p:cNvPr>
+            <p:cNvSpPr/>
+            <p:nvPr/>
+          </p:nvSpPr>
+          <p:spPr>
+            <a:xfrm>
+              <a:off x="6461760" y="1630680"/>
+              <a:ext cx="477520" cy="457200"/>
+            </a:xfrm>
+            <a:prstGeom prst="ellipse">
+              <a:avLst/>
+            </a:prstGeom>
+          </p:spPr>
+          <p:style>
+            <a:lnRef idx="2">
+              <a:schemeClr val="accent4">
+                <a:shade val="50000"/>
+              </a:schemeClr>
+            </a:lnRef>
+            <a:fillRef idx="1">
+              <a:schemeClr val="accent4"/>
+            </a:fillRef>
+            <a:effectRef idx="0">
+              <a:schemeClr val="accent4"/>
+            </a:effectRef>
+            <a:fontRef idx="minor">
+              <a:schemeClr val="lt1"/>
+            </a:fontRef>
+          </p:style>
+          <p:txBody>
+            <a:bodyPr rtlCol="0" anchor="ctr"/>
+            <a:lstStyle/>
+            <a:p>
+              <a:pPr algn="ctr"/>
+              <a:endParaRPr lang="en-US"/>
+            </a:p>
+          </p:txBody>
+        </p:sp>
+      </p:grpSp>
+      <p:grpSp>
+        <p:nvGrpSpPr>
+          <p:cNvPr id="24" name="Group 23">
+            <a:extLst>
+              <a:ext uri="{FF2B5EF4-FFF2-40B4-BE49-F238E27FC236}">
+                <a16:creationId xmlns:a16="http://schemas.microsoft.com/office/drawing/2014/main" id="{478D496E-1A71-443F-B9B5-A9F5ABB73273}"/>
+              </a:ext>
+            </a:extLst>
+          </p:cNvPr>
+          <p:cNvGrpSpPr/>
+          <p:nvPr/>
+        </p:nvGrpSpPr>
+        <p:grpSpPr>
+          <a:xfrm>
+            <a:off x="2661920" y="2128520"/>
+            <a:ext cx="589280" cy="553720"/>
+            <a:chOff x="6461760" y="1402080"/>
+            <a:chExt cx="716280" cy="685800"/>
+          </a:xfrm>
+        </p:grpSpPr>
+        <p:sp>
+          <p:nvSpPr>
+            <p:cNvPr id="25" name="Oval 24">
+              <a:extLst>
+                <a:ext uri="{FF2B5EF4-FFF2-40B4-BE49-F238E27FC236}">
+                  <a16:creationId xmlns:a16="http://schemas.microsoft.com/office/drawing/2014/main" id="{4DE8E9B6-E84F-4CF4-8348-89FB34607FB1}"/>
+                </a:ext>
+              </a:extLst>
+            </p:cNvPr>
+            <p:cNvSpPr/>
+            <p:nvPr/>
+          </p:nvSpPr>
+          <p:spPr>
+            <a:xfrm>
+              <a:off x="6461760" y="1402080"/>
+              <a:ext cx="477520" cy="457200"/>
+            </a:xfrm>
+            <a:prstGeom prst="ellipse">
+              <a:avLst/>
+            </a:prstGeom>
+          </p:spPr>
+          <p:style>
+            <a:lnRef idx="2">
+              <a:schemeClr val="accent1">
+                <a:shade val="50000"/>
+              </a:schemeClr>
+            </a:lnRef>
+            <a:fillRef idx="1">
+              <a:schemeClr val="accent1"/>
+            </a:fillRef>
+            <a:effectRef idx="0">
+              <a:schemeClr val="accent1"/>
+            </a:effectRef>
+            <a:fontRef idx="minor">
+              <a:schemeClr val="lt1"/>
+            </a:fontRef>
+          </p:style>
+          <p:txBody>
+            <a:bodyPr rtlCol="0" anchor="ctr"/>
+            <a:lstStyle/>
+            <a:p>
+              <a:pPr algn="ctr"/>
+              <a:endParaRPr lang="en-US"/>
+            </a:p>
+          </p:txBody>
+        </p:sp>
+        <p:sp>
+          <p:nvSpPr>
+            <p:cNvPr id="26" name="Oval 25">
+              <a:extLst>
+                <a:ext uri="{FF2B5EF4-FFF2-40B4-BE49-F238E27FC236}">
+                  <a16:creationId xmlns:a16="http://schemas.microsoft.com/office/drawing/2014/main" id="{A3B1AF85-2F59-4CCF-9661-18F5D924E669}"/>
+                </a:ext>
+              </a:extLst>
+            </p:cNvPr>
+            <p:cNvSpPr/>
+            <p:nvPr/>
+          </p:nvSpPr>
+          <p:spPr>
+            <a:xfrm>
+              <a:off x="6700520" y="1402080"/>
+              <a:ext cx="477520" cy="457200"/>
+            </a:xfrm>
+            <a:prstGeom prst="ellipse">
+              <a:avLst/>
+            </a:prstGeom>
+            <a:ln>
+              <a:noFill/>
+            </a:ln>
+          </p:spPr>
+          <p:style>
+            <a:lnRef idx="3">
+              <a:schemeClr val="lt1"/>
+            </a:lnRef>
+            <a:fillRef idx="1">
+              <a:schemeClr val="accent2"/>
+            </a:fillRef>
+            <a:effectRef idx="1">
+              <a:schemeClr val="accent2"/>
+            </a:effectRef>
+            <a:fontRef idx="minor">
+              <a:schemeClr val="lt1"/>
+            </a:fontRef>
+          </p:style>
+          <p:txBody>
+            <a:bodyPr rtlCol="0" anchor="ctr"/>
+            <a:lstStyle/>
+            <a:p>
+              <a:pPr algn="ctr"/>
+              <a:endParaRPr lang="en-US"/>
+            </a:p>
+          </p:txBody>
+        </p:sp>
+        <p:sp>
+          <p:nvSpPr>
+            <p:cNvPr id="27" name="Oval 26">
+              <a:extLst>
+                <a:ext uri="{FF2B5EF4-FFF2-40B4-BE49-F238E27FC236}">
+                  <a16:creationId xmlns:a16="http://schemas.microsoft.com/office/drawing/2014/main" id="{A8456897-58CF-41BC-A763-B0CDFF796D65}"/>
+                </a:ext>
+              </a:extLst>
+            </p:cNvPr>
+            <p:cNvSpPr/>
+            <p:nvPr/>
+          </p:nvSpPr>
+          <p:spPr>
+            <a:xfrm>
+              <a:off x="6700520" y="1630680"/>
+              <a:ext cx="477520" cy="457200"/>
+            </a:xfrm>
+            <a:prstGeom prst="ellipse">
+              <a:avLst/>
+            </a:prstGeom>
+          </p:spPr>
+          <p:style>
+            <a:lnRef idx="2">
+              <a:schemeClr val="accent6">
+                <a:shade val="50000"/>
+              </a:schemeClr>
+            </a:lnRef>
+            <a:fillRef idx="1">
+              <a:schemeClr val="accent6"/>
+            </a:fillRef>
+            <a:effectRef idx="0">
+              <a:schemeClr val="accent6"/>
+            </a:effectRef>
+            <a:fontRef idx="minor">
+              <a:schemeClr val="lt1"/>
+            </a:fontRef>
+          </p:style>
+          <p:txBody>
+            <a:bodyPr rtlCol="0" anchor="ctr"/>
+            <a:lstStyle/>
+            <a:p>
+              <a:pPr algn="ctr"/>
+              <a:endParaRPr lang="en-US"/>
+            </a:p>
+          </p:txBody>
+        </p:sp>
+        <p:sp>
+          <p:nvSpPr>
+            <p:cNvPr id="28" name="Oval 27">
+              <a:extLst>
+                <a:ext uri="{FF2B5EF4-FFF2-40B4-BE49-F238E27FC236}">
+                  <a16:creationId xmlns:a16="http://schemas.microsoft.com/office/drawing/2014/main" id="{CBA64715-28DF-4F34-A00A-0756C7495B92}"/>
+                </a:ext>
+              </a:extLst>
+            </p:cNvPr>
+            <p:cNvSpPr/>
+            <p:nvPr/>
+          </p:nvSpPr>
+          <p:spPr>
+            <a:xfrm>
+              <a:off x="6461760" y="1630680"/>
+              <a:ext cx="477520" cy="457200"/>
+            </a:xfrm>
+            <a:prstGeom prst="ellipse">
+              <a:avLst/>
+            </a:prstGeom>
+          </p:spPr>
+          <p:style>
+            <a:lnRef idx="2">
+              <a:schemeClr val="accent4">
+                <a:shade val="50000"/>
+              </a:schemeClr>
+            </a:lnRef>
+            <a:fillRef idx="1">
+              <a:schemeClr val="accent4"/>
+            </a:fillRef>
+            <a:effectRef idx="0">
+              <a:schemeClr val="accent4"/>
+            </a:effectRef>
+            <a:fontRef idx="minor">
+              <a:schemeClr val="lt1"/>
+            </a:fontRef>
+          </p:style>
+          <p:txBody>
+            <a:bodyPr rtlCol="0" anchor="ctr"/>
+            <a:lstStyle/>
+            <a:p>
+              <a:pPr algn="ctr"/>
+              <a:endParaRPr lang="en-US"/>
+            </a:p>
+          </p:txBody>
+        </p:sp>
+      </p:grpSp>
+      <p:grpSp>
+        <p:nvGrpSpPr>
+          <p:cNvPr id="46" name="Group 45">
+            <a:extLst>
+              <a:ext uri="{FF2B5EF4-FFF2-40B4-BE49-F238E27FC236}">
+                <a16:creationId xmlns:a16="http://schemas.microsoft.com/office/drawing/2014/main" id="{CB310DA8-5902-4A85-BE94-8BBE14F6442E}"/>
+              </a:ext>
+            </a:extLst>
+          </p:cNvPr>
+          <p:cNvGrpSpPr/>
+          <p:nvPr/>
+        </p:nvGrpSpPr>
+        <p:grpSpPr>
+          <a:xfrm>
+            <a:off x="2433320" y="3132560"/>
+            <a:ext cx="2355132" cy="1890083"/>
+            <a:chOff x="2433320" y="3132560"/>
+            <a:chExt cx="2355132" cy="1890083"/>
+          </a:xfrm>
+        </p:grpSpPr>
+        <p:sp>
+          <p:nvSpPr>
+            <p:cNvPr id="30" name="TextBox 29">
+              <a:extLst>
+                <a:ext uri="{FF2B5EF4-FFF2-40B4-BE49-F238E27FC236}">
+                  <a16:creationId xmlns:a16="http://schemas.microsoft.com/office/drawing/2014/main" id="{96AC3D8F-F05E-4095-977E-CC316372DF63}"/>
+                </a:ext>
+              </a:extLst>
+            </p:cNvPr>
+            <p:cNvSpPr txBox="1"/>
+            <p:nvPr/>
+          </p:nvSpPr>
+          <p:spPr>
+            <a:xfrm>
+              <a:off x="2433320" y="4099313"/>
+              <a:ext cx="2355132" cy="923330"/>
+            </a:xfrm>
+            <a:prstGeom prst="rect">
+              <a:avLst/>
+            </a:prstGeom>
+            <a:noFill/>
+          </p:spPr>
+          <p:txBody>
+            <a:bodyPr wrap="none" rtlCol="0">
+              <a:spAutoFit/>
+            </a:bodyPr>
+            <a:lstStyle/>
+            <a:p>
+              <a:r>
+                <a:rPr lang="en-US" sz="5400" dirty="0" err="1">
+                  <a:solidFill>
+                    <a:schemeClr val="bg1"/>
+                  </a:solidFill>
+                  <a:latin typeface="Ink Free" panose="03080402000500000000" pitchFamily="66" charset="0"/>
+                </a:rPr>
+                <a:t>DevEye</a:t>
+              </a:r>
+              <a:endParaRPr lang="en-US" sz="5400" dirty="0">
+                <a:solidFill>
+                  <a:schemeClr val="bg1"/>
+                </a:solidFill>
+                <a:latin typeface="Ink Free" panose="03080402000500000000" pitchFamily="66" charset="0"/>
+              </a:endParaRPr>
+            </a:p>
+          </p:txBody>
+        </p:sp>
+        <p:grpSp>
+          <p:nvGrpSpPr>
+            <p:cNvPr id="45" name="Group 44">
+              <a:extLst>
+                <a:ext uri="{FF2B5EF4-FFF2-40B4-BE49-F238E27FC236}">
+                  <a16:creationId xmlns:a16="http://schemas.microsoft.com/office/drawing/2014/main" id="{920F3FA8-272B-413E-9D01-B709A4BE290D}"/>
+                </a:ext>
+              </a:extLst>
+            </p:cNvPr>
+            <p:cNvGrpSpPr/>
+            <p:nvPr/>
+          </p:nvGrpSpPr>
+          <p:grpSpPr>
+            <a:xfrm>
+              <a:off x="3054773" y="3132560"/>
+              <a:ext cx="1060028" cy="1030203"/>
+              <a:chOff x="3054773" y="3132560"/>
+              <a:chExt cx="1060028" cy="1030203"/>
+            </a:xfrm>
+          </p:grpSpPr>
+          <p:sp>
+            <p:nvSpPr>
+              <p:cNvPr id="31" name="Oval 30">
+                <a:extLst>
+                  <a:ext uri="{FF2B5EF4-FFF2-40B4-BE49-F238E27FC236}">
+                    <a16:creationId xmlns:a16="http://schemas.microsoft.com/office/drawing/2014/main" id="{D49DB090-1ED9-44B4-9FB1-601E8D7FE636}"/>
+                  </a:ext>
+                </a:extLst>
+              </p:cNvPr>
+              <p:cNvSpPr/>
+              <p:nvPr/>
+            </p:nvSpPr>
+            <p:spPr>
+              <a:xfrm>
+                <a:off x="3054773" y="3429000"/>
+                <a:ext cx="1060028" cy="733763"/>
+              </a:xfrm>
+              <a:prstGeom prst="ellipse">
+                <a:avLst/>
+              </a:prstGeom>
+            </p:spPr>
+            <p:style>
+              <a:lnRef idx="2">
+                <a:schemeClr val="accent1">
+                  <a:shade val="50000"/>
+                </a:schemeClr>
+              </a:lnRef>
+              <a:fillRef idx="1">
+                <a:schemeClr val="accent1"/>
+              </a:fillRef>
+              <a:effectRef idx="0">
+                <a:schemeClr val="accent1"/>
+              </a:effectRef>
+              <a:fontRef idx="minor">
+                <a:schemeClr val="lt1"/>
+              </a:fontRef>
+            </p:style>
+            <p:txBody>
+              <a:bodyPr rtlCol="0" anchor="ctr"/>
+              <a:lstStyle/>
+              <a:p>
+                <a:pPr algn="ctr"/>
+                <a:endParaRPr lang="en-US"/>
+              </a:p>
+            </p:txBody>
+          </p:sp>
+          <p:sp>
+            <p:nvSpPr>
+              <p:cNvPr id="33" name="Oval 32">
+                <a:extLst>
+                  <a:ext uri="{FF2B5EF4-FFF2-40B4-BE49-F238E27FC236}">
+                    <a16:creationId xmlns:a16="http://schemas.microsoft.com/office/drawing/2014/main" id="{CBEB76E8-C375-4297-B8D4-AC192CA68BD5}"/>
+                  </a:ext>
+                </a:extLst>
+              </p:cNvPr>
+              <p:cNvSpPr/>
+              <p:nvPr/>
+            </p:nvSpPr>
+            <p:spPr>
+              <a:xfrm>
+                <a:off x="3339952" y="3603246"/>
+                <a:ext cx="477520" cy="457200"/>
+              </a:xfrm>
+              <a:prstGeom prst="ellipse">
+                <a:avLst/>
+              </a:prstGeom>
+            </p:spPr>
+            <p:style>
+              <a:lnRef idx="2">
+                <a:schemeClr val="accent4">
+                  <a:shade val="50000"/>
+                </a:schemeClr>
+              </a:lnRef>
+              <a:fillRef idx="1">
+                <a:schemeClr val="accent4"/>
+              </a:fillRef>
+              <a:effectRef idx="0">
+                <a:schemeClr val="accent4"/>
+              </a:effectRef>
+              <a:fontRef idx="minor">
+                <a:schemeClr val="lt1"/>
+              </a:fontRef>
+            </p:style>
+            <p:txBody>
+              <a:bodyPr rtlCol="0" anchor="ctr"/>
+              <a:lstStyle/>
+              <a:p>
+                <a:pPr algn="ctr"/>
+                <a:endParaRPr lang="en-US"/>
+              </a:p>
+            </p:txBody>
+          </p:sp>
+          <p:sp>
+            <p:nvSpPr>
+              <p:cNvPr id="35" name="Oval 34">
+                <a:extLst>
+                  <a:ext uri="{FF2B5EF4-FFF2-40B4-BE49-F238E27FC236}">
+                    <a16:creationId xmlns:a16="http://schemas.microsoft.com/office/drawing/2014/main" id="{8C2EDEE6-3E52-4BCF-A425-979C3D11C110}"/>
+                  </a:ext>
+                </a:extLst>
+              </p:cNvPr>
+              <p:cNvSpPr/>
+              <p:nvPr/>
+            </p:nvSpPr>
+            <p:spPr>
+              <a:xfrm>
+                <a:off x="3558392" y="3553805"/>
+                <a:ext cx="298378" cy="278041"/>
+              </a:xfrm>
+              <a:prstGeom prst="ellipse">
+                <a:avLst/>
+              </a:prstGeom>
+              <a:ln>
+                <a:noFill/>
+              </a:ln>
+            </p:spPr>
+            <p:style>
+              <a:lnRef idx="2">
+                <a:schemeClr val="accent1">
+                  <a:shade val="50000"/>
+                </a:schemeClr>
+              </a:lnRef>
+              <a:fillRef idx="1">
+                <a:schemeClr val="accent1"/>
+              </a:fillRef>
+              <a:effectRef idx="0">
+                <a:schemeClr val="accent1"/>
+              </a:effectRef>
+              <a:fontRef idx="minor">
+                <a:schemeClr val="lt1"/>
+              </a:fontRef>
+            </p:style>
+            <p:txBody>
+              <a:bodyPr rtlCol="0" anchor="ctr"/>
+              <a:lstStyle/>
+              <a:p>
+                <a:pPr algn="ctr"/>
+                <a:endParaRPr lang="en-US"/>
+              </a:p>
+            </p:txBody>
+          </p:sp>
+          <p:sp>
+            <p:nvSpPr>
+              <p:cNvPr id="40" name="Moon 39">
+                <a:extLst>
+                  <a:ext uri="{FF2B5EF4-FFF2-40B4-BE49-F238E27FC236}">
+                    <a16:creationId xmlns:a16="http://schemas.microsoft.com/office/drawing/2014/main" id="{648FBF0A-97FF-4235-969E-DC898574C628}"/>
+                  </a:ext>
+                </a:extLst>
+              </p:cNvPr>
+              <p:cNvSpPr/>
+              <p:nvPr/>
+            </p:nvSpPr>
+            <p:spPr>
+              <a:xfrm>
+                <a:off x="3291092" y="3133778"/>
+                <a:ext cx="191698" cy="467360"/>
+              </a:xfrm>
+              <a:prstGeom prst="moon">
+                <a:avLst/>
+              </a:prstGeom>
+              <a:solidFill>
+                <a:schemeClr val="bg1"/>
+              </a:solidFill>
+            </p:spPr>
+            <p:style>
+              <a:lnRef idx="2">
+                <a:schemeClr val="accent1">
+                  <a:shade val="50000"/>
+                </a:schemeClr>
+              </a:lnRef>
+              <a:fillRef idx="1">
+                <a:schemeClr val="accent1"/>
+              </a:fillRef>
+              <a:effectRef idx="0">
+                <a:schemeClr val="accent1"/>
+              </a:effectRef>
+              <a:fontRef idx="minor">
+                <a:schemeClr val="lt1"/>
+              </a:fontRef>
+            </p:style>
+            <p:txBody>
+              <a:bodyPr rtlCol="0" anchor="ctr"/>
+              <a:lstStyle/>
+              <a:p>
+                <a:pPr algn="ctr"/>
+                <a:endParaRPr lang="en-US"/>
+              </a:p>
+            </p:txBody>
+          </p:sp>
+          <p:sp>
+            <p:nvSpPr>
+              <p:cNvPr id="42" name="Moon 41">
+                <a:extLst>
+                  <a:ext uri="{FF2B5EF4-FFF2-40B4-BE49-F238E27FC236}">
+                    <a16:creationId xmlns:a16="http://schemas.microsoft.com/office/drawing/2014/main" id="{03DC39C5-2319-4430-89D1-26955DC4678A}"/>
+                  </a:ext>
+                </a:extLst>
+              </p:cNvPr>
+              <p:cNvSpPr/>
+              <p:nvPr/>
+            </p:nvSpPr>
+            <p:spPr>
+              <a:xfrm rot="2455376">
+                <a:off x="3521631" y="3132560"/>
+                <a:ext cx="191698" cy="467360"/>
+              </a:xfrm>
+              <a:prstGeom prst="moon">
+                <a:avLst/>
+              </a:prstGeom>
+              <a:solidFill>
+                <a:schemeClr val="bg1"/>
+              </a:solidFill>
+            </p:spPr>
+            <p:style>
+              <a:lnRef idx="2">
+                <a:schemeClr val="accent1">
+                  <a:shade val="50000"/>
+                </a:schemeClr>
+              </a:lnRef>
+              <a:fillRef idx="1">
+                <a:schemeClr val="accent1"/>
+              </a:fillRef>
+              <a:effectRef idx="0">
+                <a:schemeClr val="accent1"/>
+              </a:effectRef>
+              <a:fontRef idx="minor">
+                <a:schemeClr val="lt1"/>
+              </a:fontRef>
+            </p:style>
+            <p:txBody>
+              <a:bodyPr rtlCol="0" anchor="ctr"/>
+              <a:lstStyle/>
+              <a:p>
+                <a:pPr algn="ctr"/>
+                <a:endParaRPr lang="en-US"/>
+              </a:p>
+            </p:txBody>
+          </p:sp>
+          <p:sp>
+            <p:nvSpPr>
+              <p:cNvPr id="44" name="Moon 43">
+                <a:extLst>
+                  <a:ext uri="{FF2B5EF4-FFF2-40B4-BE49-F238E27FC236}">
+                    <a16:creationId xmlns:a16="http://schemas.microsoft.com/office/drawing/2014/main" id="{333E3A59-3EBF-40B6-A609-A236C50B9581}"/>
+                  </a:ext>
+                </a:extLst>
+              </p:cNvPr>
+              <p:cNvSpPr/>
+              <p:nvPr/>
+            </p:nvSpPr>
+            <p:spPr>
+              <a:xfrm rot="4434331">
+                <a:off x="3692941" y="3244604"/>
+                <a:ext cx="191698" cy="467360"/>
+              </a:xfrm>
+              <a:prstGeom prst="moon">
+                <a:avLst/>
+              </a:prstGeom>
+              <a:solidFill>
+                <a:schemeClr val="bg1"/>
+              </a:solidFill>
+            </p:spPr>
+            <p:style>
+              <a:lnRef idx="2">
+                <a:schemeClr val="accent1">
+                  <a:shade val="50000"/>
+                </a:schemeClr>
+              </a:lnRef>
+              <a:fillRef idx="1">
+                <a:schemeClr val="accent1"/>
+              </a:fillRef>
+              <a:effectRef idx="0">
+                <a:schemeClr val="accent1"/>
+              </a:effectRef>
+              <a:fontRef idx="minor">
+                <a:schemeClr val="lt1"/>
+              </a:fontRef>
+            </p:style>
+            <p:txBody>
+              <a:bodyPr rtlCol="0" anchor="ctr"/>
+              <a:lstStyle/>
+              <a:p>
+                <a:pPr algn="ctr"/>
+                <a:endParaRPr lang="en-US"/>
+              </a:p>
+            </p:txBody>
+          </p:sp>
+        </p:grpSp>
+      </p:grpSp>
     </p:spTree>
     <p:extLst>
       <p:ext uri="{BB962C8B-B14F-4D97-AF65-F5344CB8AC3E}">

</xml_diff>

<commit_message>
fix: #2. resolve the header width issue
</commit_message>
<xml_diff>
--- a/docs/icon-design.pptx
+++ b/docs/icon-design.pptx
@@ -6,7 +6,8 @@
   </p:sldMasterIdLst>
   <p:sldIdLst>
     <p:sldId id="256" r:id="rId2"/>
-    <p:sldId id="257" r:id="rId3"/>
+    <p:sldId id="258" r:id="rId3"/>
+    <p:sldId id="257" r:id="rId4"/>
   </p:sldIdLst>
   <p:sldSz cx="12192000" cy="6858000"/>
   <p:notesSz cx="6858000" cy="9144000"/>
@@ -260,7 +261,7 @@
           <a:p>
             <a:fld id="{22BA11A9-CA4B-450C-8844-99692A061B26}" type="datetimeFigureOut">
               <a:rPr lang="en-US" smtClean="0"/>
-              <a:t>8/31/2020</a:t>
+              <a:t>9/2/2020</a:t>
             </a:fld>
             <a:endParaRPr lang="en-US"/>
           </a:p>
@@ -458,7 +459,7 @@
           <a:p>
             <a:fld id="{22BA11A9-CA4B-450C-8844-99692A061B26}" type="datetimeFigureOut">
               <a:rPr lang="en-US" smtClean="0"/>
-              <a:t>8/31/2020</a:t>
+              <a:t>9/2/2020</a:t>
             </a:fld>
             <a:endParaRPr lang="en-US"/>
           </a:p>
@@ -666,7 +667,7 @@
           <a:p>
             <a:fld id="{22BA11A9-CA4B-450C-8844-99692A061B26}" type="datetimeFigureOut">
               <a:rPr lang="en-US" smtClean="0"/>
-              <a:t>8/31/2020</a:t>
+              <a:t>9/2/2020</a:t>
             </a:fld>
             <a:endParaRPr lang="en-US"/>
           </a:p>
@@ -864,7 +865,7 @@
           <a:p>
             <a:fld id="{22BA11A9-CA4B-450C-8844-99692A061B26}" type="datetimeFigureOut">
               <a:rPr lang="en-US" smtClean="0"/>
-              <a:t>8/31/2020</a:t>
+              <a:t>9/2/2020</a:t>
             </a:fld>
             <a:endParaRPr lang="en-US"/>
           </a:p>
@@ -1139,7 +1140,7 @@
           <a:p>
             <a:fld id="{22BA11A9-CA4B-450C-8844-99692A061B26}" type="datetimeFigureOut">
               <a:rPr lang="en-US" smtClean="0"/>
-              <a:t>8/31/2020</a:t>
+              <a:t>9/2/2020</a:t>
             </a:fld>
             <a:endParaRPr lang="en-US"/>
           </a:p>
@@ -1404,7 +1405,7 @@
           <a:p>
             <a:fld id="{22BA11A9-CA4B-450C-8844-99692A061B26}" type="datetimeFigureOut">
               <a:rPr lang="en-US" smtClean="0"/>
-              <a:t>8/31/2020</a:t>
+              <a:t>9/2/2020</a:t>
             </a:fld>
             <a:endParaRPr lang="en-US"/>
           </a:p>
@@ -1816,7 +1817,7 @@
           <a:p>
             <a:fld id="{22BA11A9-CA4B-450C-8844-99692A061B26}" type="datetimeFigureOut">
               <a:rPr lang="en-US" smtClean="0"/>
-              <a:t>8/31/2020</a:t>
+              <a:t>9/2/2020</a:t>
             </a:fld>
             <a:endParaRPr lang="en-US"/>
           </a:p>
@@ -1957,7 +1958,7 @@
           <a:p>
             <a:fld id="{22BA11A9-CA4B-450C-8844-99692A061B26}" type="datetimeFigureOut">
               <a:rPr lang="en-US" smtClean="0"/>
-              <a:t>8/31/2020</a:t>
+              <a:t>9/2/2020</a:t>
             </a:fld>
             <a:endParaRPr lang="en-US"/>
           </a:p>
@@ -2070,7 +2071,7 @@
           <a:p>
             <a:fld id="{22BA11A9-CA4B-450C-8844-99692A061B26}" type="datetimeFigureOut">
               <a:rPr lang="en-US" smtClean="0"/>
-              <a:t>8/31/2020</a:t>
+              <a:t>9/2/2020</a:t>
             </a:fld>
             <a:endParaRPr lang="en-US"/>
           </a:p>
@@ -2381,7 +2382,7 @@
           <a:p>
             <a:fld id="{22BA11A9-CA4B-450C-8844-99692A061B26}" type="datetimeFigureOut">
               <a:rPr lang="en-US" smtClean="0"/>
-              <a:t>8/31/2020</a:t>
+              <a:t>9/2/2020</a:t>
             </a:fld>
             <a:endParaRPr lang="en-US"/>
           </a:p>
@@ -2669,7 +2670,7 @@
           <a:p>
             <a:fld id="{22BA11A9-CA4B-450C-8844-99692A061B26}" type="datetimeFigureOut">
               <a:rPr lang="en-US" smtClean="0"/>
-              <a:t>8/31/2020</a:t>
+              <a:t>9/2/2020</a:t>
             </a:fld>
             <a:endParaRPr lang="en-US"/>
           </a:p>
@@ -2910,7 +2911,7 @@
           <a:p>
             <a:fld id="{22BA11A9-CA4B-450C-8844-99692A061B26}" type="datetimeFigureOut">
               <a:rPr lang="en-US" smtClean="0"/>
-              <a:t>8/31/2020</a:t>
+              <a:t>9/2/2020</a:t>
             </a:fld>
             <a:endParaRPr lang="en-US"/>
           </a:p>
@@ -4323,6 +4324,14 @@
 <file path=ppt/slides/slide2.xml><?xml version="1.0" encoding="utf-8"?>
 <p:sld xmlns:a="http://schemas.openxmlformats.org/drawingml/2006/main" xmlns:r="http://schemas.openxmlformats.org/officeDocument/2006/relationships" xmlns:p="http://schemas.openxmlformats.org/presentationml/2006/main">
   <p:cSld>
+    <p:bg>
+      <p:bgPr>
+        <a:solidFill>
+          <a:schemeClr val="tx1"/>
+        </a:solidFill>
+        <a:effectLst/>
+      </p:bgPr>
+    </p:bg>
     <p:spTree>
       <p:nvGrpSpPr>
         <p:cNvPr id="1" name=""/>
@@ -4337,6 +4346,272 @@
           <a:chExt cx="0" cy="0"/>
         </a:xfrm>
       </p:grpSpPr>
+      <p:grpSp>
+        <p:nvGrpSpPr>
+          <p:cNvPr id="4" name="Group 3">
+            <a:extLst>
+              <a:ext uri="{FF2B5EF4-FFF2-40B4-BE49-F238E27FC236}">
+                <a16:creationId xmlns:a16="http://schemas.microsoft.com/office/drawing/2014/main" id="{685C8A8A-CAD8-4798-B3A0-72903150C710}"/>
+              </a:ext>
+            </a:extLst>
+          </p:cNvPr>
+          <p:cNvGrpSpPr/>
+          <p:nvPr/>
+        </p:nvGrpSpPr>
+        <p:grpSpPr>
+          <a:xfrm>
+            <a:off x="4061378" y="527538"/>
+            <a:ext cx="3863422" cy="3600000"/>
+            <a:chOff x="4061378" y="527538"/>
+            <a:chExt cx="3863422" cy="3600000"/>
+          </a:xfrm>
+        </p:grpSpPr>
+        <p:sp>
+          <p:nvSpPr>
+            <p:cNvPr id="3" name="Oval 2">
+              <a:extLst>
+                <a:ext uri="{FF2B5EF4-FFF2-40B4-BE49-F238E27FC236}">
+                  <a16:creationId xmlns:a16="http://schemas.microsoft.com/office/drawing/2014/main" id="{B0C8FA3B-0A92-416D-BE90-B5AC06F275A1}"/>
+                </a:ext>
+              </a:extLst>
+            </p:cNvPr>
+            <p:cNvSpPr/>
+            <p:nvPr/>
+          </p:nvSpPr>
+          <p:spPr>
+            <a:xfrm>
+              <a:off x="4061378" y="527538"/>
+              <a:ext cx="3600000" cy="3600000"/>
+            </a:xfrm>
+            <a:prstGeom prst="ellipse">
+              <a:avLst/>
+            </a:prstGeom>
+          </p:spPr>
+          <p:style>
+            <a:lnRef idx="2">
+              <a:schemeClr val="accent1">
+                <a:shade val="50000"/>
+              </a:schemeClr>
+            </a:lnRef>
+            <a:fillRef idx="1">
+              <a:schemeClr val="accent1"/>
+            </a:fillRef>
+            <a:effectRef idx="0">
+              <a:schemeClr val="accent1"/>
+            </a:effectRef>
+            <a:fontRef idx="minor">
+              <a:schemeClr val="lt1"/>
+            </a:fontRef>
+          </p:style>
+          <p:txBody>
+            <a:bodyPr rtlCol="0" anchor="ctr"/>
+            <a:lstStyle/>
+            <a:p>
+              <a:pPr algn="ctr"/>
+              <a:endParaRPr lang="en-US"/>
+            </a:p>
+          </p:txBody>
+        </p:sp>
+        <p:sp>
+          <p:nvSpPr>
+            <p:cNvPr id="9" name="TextBox 8">
+              <a:extLst>
+                <a:ext uri="{FF2B5EF4-FFF2-40B4-BE49-F238E27FC236}">
+                  <a16:creationId xmlns:a16="http://schemas.microsoft.com/office/drawing/2014/main" id="{169FF85C-2B39-4DBF-A3F2-EA335C132E07}"/>
+                </a:ext>
+              </a:extLst>
+            </p:cNvPr>
+            <p:cNvSpPr txBox="1"/>
+            <p:nvPr/>
+          </p:nvSpPr>
+          <p:spPr>
+            <a:xfrm>
+              <a:off x="4061378" y="1004099"/>
+              <a:ext cx="3599999" cy="2646878"/>
+            </a:xfrm>
+            <a:prstGeom prst="rect">
+              <a:avLst/>
+            </a:prstGeom>
+            <a:noFill/>
+          </p:spPr>
+          <p:txBody>
+            <a:bodyPr wrap="square" rtlCol="0">
+              <a:spAutoFit/>
+            </a:bodyPr>
+            <a:lstStyle/>
+            <a:p>
+              <a:pPr algn="ctr"/>
+              <a:r>
+                <a:rPr lang="en-US" sz="16600" b="1" dirty="0">
+                  <a:ln w="10160">
+                    <a:solidFill>
+                      <a:schemeClr val="accent5"/>
+                    </a:solidFill>
+                    <a:prstDash val="solid"/>
+                  </a:ln>
+                  <a:solidFill>
+                    <a:srgbClr val="FFFFFF"/>
+                  </a:solidFill>
+                  <a:effectLst>
+                    <a:outerShdw blurRad="38100" dist="22860" dir="5400000" algn="tl" rotWithShape="0">
+                      <a:srgbClr val="000000">
+                        <a:alpha val="30000"/>
+                      </a:srgbClr>
+                    </a:outerShdw>
+                  </a:effectLst>
+                  <a:latin typeface="Ink Free" panose="03080402000500000000" pitchFamily="66" charset="0"/>
+                </a:rPr>
+                <a:t>C</a:t>
+              </a:r>
+              <a:r>
+                <a:rPr lang="en-US" sz="8800" b="1" dirty="0">
+                  <a:ln w="10160">
+                    <a:solidFill>
+                      <a:schemeClr val="accent5"/>
+                    </a:solidFill>
+                    <a:prstDash val="solid"/>
+                  </a:ln>
+                  <a:solidFill>
+                    <a:srgbClr val="FFFFFF"/>
+                  </a:solidFill>
+                  <a:effectLst>
+                    <a:outerShdw blurRad="38100" dist="22860" dir="5400000" algn="tl" rotWithShape="0">
+                      <a:srgbClr val="000000">
+                        <a:alpha val="30000"/>
+                      </a:srgbClr>
+                    </a:outerShdw>
+                  </a:effectLst>
+                  <a:latin typeface="Ink Free" panose="03080402000500000000" pitchFamily="66" charset="0"/>
+                </a:rPr>
+                <a:t> </a:t>
+              </a:r>
+              <a:r>
+                <a:rPr lang="en-US" sz="11500" b="1" dirty="0">
+                  <a:ln w="10160">
+                    <a:solidFill>
+                      <a:schemeClr val="accent5"/>
+                    </a:solidFill>
+                    <a:prstDash val="solid"/>
+                  </a:ln>
+                  <a:solidFill>
+                    <a:srgbClr val="FFFFFF"/>
+                  </a:solidFill>
+                  <a:effectLst>
+                    <a:outerShdw blurRad="38100" dist="22860" dir="5400000" algn="tl" rotWithShape="0">
+                      <a:srgbClr val="000000">
+                        <a:alpha val="30000"/>
+                      </a:srgbClr>
+                    </a:outerShdw>
+                  </a:effectLst>
+                  <a:latin typeface="Ink Free" panose="03080402000500000000" pitchFamily="66" charset="0"/>
+                </a:rPr>
+                <a:t>V</a:t>
+              </a:r>
+              <a:endParaRPr lang="en-US" sz="8000" b="1" dirty="0">
+                <a:ln w="10160">
+                  <a:solidFill>
+                    <a:schemeClr val="accent5"/>
+                  </a:solidFill>
+                  <a:prstDash val="solid"/>
+                </a:ln>
+                <a:solidFill>
+                  <a:srgbClr val="FFFFFF"/>
+                </a:solidFill>
+                <a:effectLst>
+                  <a:outerShdw blurRad="38100" dist="22860" dir="5400000" algn="tl" rotWithShape="0">
+                    <a:srgbClr val="000000">
+                      <a:alpha val="30000"/>
+                    </a:srgbClr>
+                  </a:outerShdw>
+                </a:effectLst>
+                <a:latin typeface="Ink Free" panose="03080402000500000000" pitchFamily="66" charset="0"/>
+              </a:endParaRPr>
+            </a:p>
+          </p:txBody>
+        </p:sp>
+        <p:sp>
+          <p:nvSpPr>
+            <p:cNvPr id="2" name="Oval 1">
+              <a:extLst>
+                <a:ext uri="{FF2B5EF4-FFF2-40B4-BE49-F238E27FC236}">
+                  <a16:creationId xmlns:a16="http://schemas.microsoft.com/office/drawing/2014/main" id="{23F6A455-A404-45B1-A4BD-C5E3EB75EEA9}"/>
+                </a:ext>
+              </a:extLst>
+            </p:cNvPr>
+            <p:cNvSpPr/>
+            <p:nvPr/>
+          </p:nvSpPr>
+          <p:spPr>
+            <a:xfrm>
+              <a:off x="6583680" y="527538"/>
+              <a:ext cx="1341120" cy="1219200"/>
+            </a:xfrm>
+            <a:prstGeom prst="ellipse">
+              <a:avLst/>
+            </a:prstGeom>
+            <a:solidFill>
+              <a:schemeClr val="tx1"/>
+            </a:solidFill>
+            <a:ln>
+              <a:noFill/>
+            </a:ln>
+          </p:spPr>
+          <p:style>
+            <a:lnRef idx="2">
+              <a:schemeClr val="accent1">
+                <a:shade val="50000"/>
+              </a:schemeClr>
+            </a:lnRef>
+            <a:fillRef idx="1">
+              <a:schemeClr val="accent1"/>
+            </a:fillRef>
+            <a:effectRef idx="0">
+              <a:schemeClr val="accent1"/>
+            </a:effectRef>
+            <a:fontRef idx="minor">
+              <a:schemeClr val="lt1"/>
+            </a:fontRef>
+          </p:style>
+          <p:txBody>
+            <a:bodyPr rtlCol="0" anchor="ctr"/>
+            <a:lstStyle/>
+            <a:p>
+              <a:pPr algn="ctr"/>
+              <a:endParaRPr lang="en-US"/>
+            </a:p>
+          </p:txBody>
+        </p:sp>
+      </p:grpSp>
+    </p:spTree>
+    <p:extLst>
+      <p:ext uri="{BB962C8B-B14F-4D97-AF65-F5344CB8AC3E}">
+        <p14:creationId xmlns:p14="http://schemas.microsoft.com/office/powerpoint/2010/main" val="389446487"/>
+      </p:ext>
+    </p:extLst>
+  </p:cSld>
+  <p:clrMapOvr>
+    <a:masterClrMapping/>
+  </p:clrMapOvr>
+</p:sld>
+</file>
+
+<file path=ppt/slides/slide3.xml><?xml version="1.0" encoding="utf-8"?>
+<p:sld xmlns:a="http://schemas.openxmlformats.org/drawingml/2006/main" xmlns:r="http://schemas.openxmlformats.org/officeDocument/2006/relationships" xmlns:p="http://schemas.openxmlformats.org/presentationml/2006/main">
+  <p:cSld>
+    <p:spTree>
+      <p:nvGrpSpPr>
+        <p:cNvPr id="1" name=""/>
+        <p:cNvGrpSpPr/>
+        <p:nvPr/>
+      </p:nvGrpSpPr>
+      <p:grpSpPr>
+        <a:xfrm>
+          <a:off x="0" y="0"/>
+          <a:ext cx="0" cy="0"/>
+          <a:chOff x="0" y="0"/>
+          <a:chExt cx="0" cy="0"/>
+        </a:xfrm>
+      </p:grpSpPr>
       <p:sp>
         <p:nvSpPr>
           <p:cNvPr id="8" name="Rectangle 7">
@@ -4482,6 +4757,221 @@
               </a:rPr>
               <a:t>&gt;&gt;</a:t>
             </a:r>
+          </a:p>
+        </p:txBody>
+      </p:sp>
+      <p:sp>
+        <p:nvSpPr>
+          <p:cNvPr id="6" name="Oval 5">
+            <a:extLst>
+              <a:ext uri="{FF2B5EF4-FFF2-40B4-BE49-F238E27FC236}">
+                <a16:creationId xmlns:a16="http://schemas.microsoft.com/office/drawing/2014/main" id="{628B70CA-A155-4220-8920-43886AB30BDD}"/>
+              </a:ext>
+            </a:extLst>
+          </p:cNvPr>
+          <p:cNvSpPr/>
+          <p:nvPr/>
+        </p:nvSpPr>
+        <p:spPr>
+          <a:xfrm>
+            <a:off x="704206" y="1629000"/>
+            <a:ext cx="3888000" cy="3887880"/>
+          </a:xfrm>
+          <a:prstGeom prst="ellipse">
+            <a:avLst/>
+          </a:prstGeom>
+        </p:spPr>
+        <p:style>
+          <a:lnRef idx="2">
+            <a:schemeClr val="accent1">
+              <a:shade val="50000"/>
+            </a:schemeClr>
+          </a:lnRef>
+          <a:fillRef idx="1">
+            <a:schemeClr val="accent1"/>
+          </a:fillRef>
+          <a:effectRef idx="0">
+            <a:schemeClr val="accent1"/>
+          </a:effectRef>
+          <a:fontRef idx="minor">
+            <a:schemeClr val="lt1"/>
+          </a:fontRef>
+        </p:style>
+        <p:txBody>
+          <a:bodyPr rtlCol="0" anchor="ctr"/>
+          <a:lstStyle/>
+          <a:p>
+            <a:pPr algn="ctr"/>
+            <a:endParaRPr lang="en-US"/>
+          </a:p>
+        </p:txBody>
+      </p:sp>
+      <p:sp>
+        <p:nvSpPr>
+          <p:cNvPr id="7" name="TextBox 6">
+            <a:extLst>
+              <a:ext uri="{FF2B5EF4-FFF2-40B4-BE49-F238E27FC236}">
+                <a16:creationId xmlns:a16="http://schemas.microsoft.com/office/drawing/2014/main" id="{58ABE8F5-3A24-434A-95ED-35E378CD3AA9}"/>
+              </a:ext>
+            </a:extLst>
+          </p:cNvPr>
+          <p:cNvSpPr txBox="1"/>
+          <p:nvPr/>
+        </p:nvSpPr>
+        <p:spPr>
+          <a:xfrm>
+            <a:off x="704206" y="2143670"/>
+            <a:ext cx="3667977" cy="2646878"/>
+          </a:xfrm>
+          <a:prstGeom prst="rect">
+            <a:avLst/>
+          </a:prstGeom>
+          <a:noFill/>
+        </p:spPr>
+        <p:txBody>
+          <a:bodyPr wrap="square" rtlCol="0">
+            <a:spAutoFit/>
+          </a:bodyPr>
+          <a:lstStyle/>
+          <a:p>
+            <a:pPr algn="ctr"/>
+            <a:r>
+              <a:rPr lang="en-US" sz="16600" b="1" dirty="0">
+                <a:ln w="10160">
+                  <a:solidFill>
+                    <a:schemeClr val="accent5"/>
+                  </a:solidFill>
+                  <a:prstDash val="solid"/>
+                </a:ln>
+                <a:solidFill>
+                  <a:srgbClr val="FFC000"/>
+                </a:solidFill>
+                <a:effectLst>
+                  <a:outerShdw blurRad="38100" dist="22860" dir="5400000" algn="tl" rotWithShape="0">
+                    <a:srgbClr val="000000">
+                      <a:alpha val="30000"/>
+                    </a:srgbClr>
+                  </a:outerShdw>
+                </a:effectLst>
+                <a:latin typeface="Ink Free" panose="03080402000500000000" pitchFamily="66" charset="0"/>
+              </a:rPr>
+              <a:t>C</a:t>
+            </a:r>
+            <a:r>
+              <a:rPr lang="en-US" sz="8800" b="1" dirty="0">
+                <a:ln w="10160">
+                  <a:solidFill>
+                    <a:schemeClr val="accent5"/>
+                  </a:solidFill>
+                  <a:prstDash val="solid"/>
+                </a:ln>
+                <a:solidFill>
+                  <a:srgbClr val="FFC000"/>
+                </a:solidFill>
+                <a:effectLst>
+                  <a:outerShdw blurRad="38100" dist="22860" dir="5400000" algn="tl" rotWithShape="0">
+                    <a:srgbClr val="000000">
+                      <a:alpha val="30000"/>
+                    </a:srgbClr>
+                  </a:outerShdw>
+                </a:effectLst>
+                <a:latin typeface="Ink Free" panose="03080402000500000000" pitchFamily="66" charset="0"/>
+              </a:rPr>
+              <a:t> </a:t>
+            </a:r>
+            <a:r>
+              <a:rPr lang="en-US" sz="11500" b="1" dirty="0">
+                <a:ln w="10160">
+                  <a:solidFill>
+                    <a:schemeClr val="accent5"/>
+                  </a:solidFill>
+                  <a:prstDash val="solid"/>
+                </a:ln>
+                <a:solidFill>
+                  <a:srgbClr val="FFC000"/>
+                </a:solidFill>
+                <a:effectLst>
+                  <a:outerShdw blurRad="38100" dist="22860" dir="5400000" algn="tl" rotWithShape="0">
+                    <a:srgbClr val="000000">
+                      <a:alpha val="30000"/>
+                    </a:srgbClr>
+                  </a:outerShdw>
+                </a:effectLst>
+                <a:latin typeface="Ink Free" panose="03080402000500000000" pitchFamily="66" charset="0"/>
+              </a:rPr>
+              <a:t>V</a:t>
+            </a:r>
+            <a:endParaRPr lang="en-US" sz="8000" b="1" dirty="0">
+              <a:ln w="10160">
+                <a:solidFill>
+                  <a:schemeClr val="accent5"/>
+                </a:solidFill>
+                <a:prstDash val="solid"/>
+              </a:ln>
+              <a:solidFill>
+                <a:srgbClr val="FFC000"/>
+              </a:solidFill>
+              <a:effectLst>
+                <a:outerShdw blurRad="38100" dist="22860" dir="5400000" algn="tl" rotWithShape="0">
+                  <a:srgbClr val="000000">
+                    <a:alpha val="30000"/>
+                  </a:srgbClr>
+                </a:outerShdw>
+              </a:effectLst>
+              <a:latin typeface="Ink Free" panose="03080402000500000000" pitchFamily="66" charset="0"/>
+            </a:endParaRPr>
+          </a:p>
+        </p:txBody>
+      </p:sp>
+      <p:sp>
+        <p:nvSpPr>
+          <p:cNvPr id="9" name="Oval 8">
+            <a:extLst>
+              <a:ext uri="{FF2B5EF4-FFF2-40B4-BE49-F238E27FC236}">
+                <a16:creationId xmlns:a16="http://schemas.microsoft.com/office/drawing/2014/main" id="{16569E93-611C-4516-B889-991DAA7CF435}"/>
+              </a:ext>
+            </a:extLst>
+          </p:cNvPr>
+          <p:cNvSpPr/>
+          <p:nvPr/>
+        </p:nvSpPr>
+        <p:spPr>
+          <a:xfrm>
+            <a:off x="3274136" y="1629000"/>
+            <a:ext cx="1366444" cy="1316695"/>
+          </a:xfrm>
+          <a:prstGeom prst="ellipse">
+            <a:avLst/>
+          </a:prstGeom>
+          <a:solidFill>
+            <a:schemeClr val="bg1"/>
+          </a:solidFill>
+          <a:ln>
+            <a:noFill/>
+          </a:ln>
+        </p:spPr>
+        <p:style>
+          <a:lnRef idx="2">
+            <a:schemeClr val="accent1">
+              <a:shade val="50000"/>
+            </a:schemeClr>
+          </a:lnRef>
+          <a:fillRef idx="1">
+            <a:schemeClr val="accent1"/>
+          </a:fillRef>
+          <a:effectRef idx="0">
+            <a:schemeClr val="accent1"/>
+          </a:effectRef>
+          <a:fontRef idx="minor">
+            <a:schemeClr val="lt1"/>
+          </a:fontRef>
+        </p:style>
+        <p:txBody>
+          <a:bodyPr rtlCol="0" anchor="ctr"/>
+          <a:lstStyle/>
+          <a:p>
+            <a:pPr algn="ctr"/>
+            <a:endParaRPr lang="en-US"/>
           </a:p>
         </p:txBody>
       </p:sp>

</xml_diff>